<commit_message>
Address all qa issues prior to applying 7.0.0 - ballot reconciliation changes
</commit_message>
<xml_diff>
--- a/input/images-source/V6_USCDI_USCore_SDOH_Vocab.pptx
+++ b/input/images-source/V6_USCDI_USCore_SDOH_Vocab.pptx
@@ -11047,12 +11047,85 @@
           <a:chExt cx="0" cy="0"/>
         </a:xfrm>
       </p:grpSpPr>
+      <p:sp>
+        <p:nvSpPr>
+          <p:cNvPr id="151" name="Google Shape;151;p26"/>
+          <p:cNvSpPr/>
+          <p:nvPr/>
+        </p:nvSpPr>
+        <p:spPr>
+          <a:xfrm>
+            <a:off x="12173" y="2343489"/>
+            <a:ext cx="907258" cy="723143"/>
+          </a:xfrm>
+          <a:prstGeom prst="rect">
+            <a:avLst/>
+          </a:prstGeom>
+          <a:noFill/>
+          <a:ln>
+            <a:noFill/>
+          </a:ln>
+        </p:spPr>
+        <p:txBody>
+          <a:bodyPr spcFirstLastPara="1" wrap="square" lIns="68575" tIns="34275" rIns="68575" bIns="34275" anchor="ctr" anchorCtr="0">
+            <a:noAutofit/>
+          </a:bodyPr>
+          <a:lstStyle/>
+          <a:p>
+            <a:pPr marL="0" marR="0" lvl="0" indent="0" algn="ctr" rtl="0">
+              <a:spcBef>
+                <a:spcPts val="0"/>
+              </a:spcBef>
+              <a:spcAft>
+                <a:spcPts val="0"/>
+              </a:spcAft>
+              <a:buNone/>
+            </a:pPr>
+            <a:r>
+              <a:rPr lang="en" b="1" i="0" u="none" strike="noStrike" cap="none" dirty="0">
+                <a:solidFill>
+                  <a:schemeClr val="dk1"/>
+                </a:solidFill>
+                <a:latin typeface="Calibri"/>
+                <a:ea typeface="Calibri"/>
+                <a:cs typeface="Calibri"/>
+                <a:sym typeface="Calibri"/>
+              </a:rPr>
+              <a:t>Gravity </a:t>
+            </a:r>
+          </a:p>
+          <a:p>
+            <a:pPr marL="0" marR="0" lvl="0" indent="0" algn="ctr" rtl="0">
+              <a:spcBef>
+                <a:spcPts val="0"/>
+              </a:spcBef>
+              <a:spcAft>
+                <a:spcPts val="0"/>
+              </a:spcAft>
+              <a:buNone/>
+            </a:pPr>
+            <a:r>
+              <a:rPr lang="en" b="1" i="0" u="none" strike="noStrike" cap="none" dirty="0">
+                <a:solidFill>
+                  <a:schemeClr val="dk1"/>
+                </a:solidFill>
+                <a:latin typeface="Calibri"/>
+                <a:ea typeface="Calibri"/>
+                <a:cs typeface="Calibri"/>
+                <a:sym typeface="Calibri"/>
+              </a:rPr>
+              <a:t>SDOH Condition Domains</a:t>
+            </a:r>
+            <a:endParaRPr dirty="0"/>
+          </a:p>
+        </p:txBody>
+      </p:sp>
       <p:grpSp>
         <p:nvGrpSpPr>
-          <p:cNvPr id="12" name="Group 11">
+          <p:cNvPr id="11" name="Group 10">
             <a:extLst>
               <a:ext uri="{FF2B5EF4-FFF2-40B4-BE49-F238E27FC236}">
-                <a16:creationId xmlns:a16="http://schemas.microsoft.com/office/drawing/2014/main" id="{B40794D7-A958-8D33-1C9B-63695B3E065E}"/>
+                <a16:creationId xmlns:a16="http://schemas.microsoft.com/office/drawing/2014/main" id="{ED732215-184E-A581-5481-A721592C3BA5}"/>
               </a:ext>
             </a:extLst>
           </p:cNvPr>
@@ -11061,29 +11134,37 @@
         </p:nvGrpSpPr>
         <p:grpSpPr>
           <a:xfrm>
-            <a:off x="50006" y="1298002"/>
-            <a:ext cx="8744094" cy="2845766"/>
-            <a:chOff x="50006" y="1298002"/>
-            <a:chExt cx="8744094" cy="2845766"/>
+            <a:off x="932189" y="1297958"/>
+            <a:ext cx="4267506" cy="2852116"/>
+            <a:chOff x="963716" y="1291652"/>
+            <a:chExt cx="4267506" cy="2852116"/>
           </a:xfrm>
         </p:grpSpPr>
         <p:sp>
           <p:nvSpPr>
-            <p:cNvPr id="151" name="Google Shape;151;p26"/>
+            <p:cNvPr id="135" name="Google Shape;135;p26"/>
             <p:cNvSpPr/>
             <p:nvPr/>
           </p:nvSpPr>
           <p:spPr>
             <a:xfrm>
-              <a:off x="50006" y="2337183"/>
-              <a:ext cx="907258" cy="723143"/>
+              <a:off x="1447800" y="1291652"/>
+              <a:ext cx="1456331" cy="411654"/>
             </a:xfrm>
             <a:prstGeom prst="rect">
               <a:avLst/>
             </a:prstGeom>
-            <a:noFill/>
-            <a:ln>
-              <a:noFill/>
+            <a:solidFill>
+              <a:schemeClr val="accent1"/>
+            </a:solidFill>
+            <a:ln w="12700" cap="flat" cmpd="sng">
+              <a:solidFill>
+                <a:srgbClr val="42719B"/>
+              </a:solidFill>
+              <a:prstDash val="solid"/>
+              <a:miter lim="800000"/>
+              <a:headEnd type="none" w="sm" len="sm"/>
+              <a:tailEnd type="none" w="sm" len="sm"/>
             </a:ln>
           </p:spPr>
           <p:txBody>
@@ -11092,7 +11173,7 @@
             </a:bodyPr>
             <a:lstStyle/>
             <a:p>
-              <a:pPr marL="0" marR="0" lvl="0" indent="0" algn="r" rtl="0">
+              <a:pPr marL="0" marR="0" lvl="0" indent="0" algn="ctr" rtl="0">
                 <a:spcBef>
                   <a:spcPts val="0"/>
                 </a:spcBef>
@@ -11102,20 +11183,55 @@
                 <a:buNone/>
               </a:pPr>
               <a:r>
-                <a:rPr lang="en" b="1" i="0" u="none" strike="noStrike" cap="none" dirty="0">
+                <a:rPr lang="en" sz="1050" b="0" i="0" u="none" strike="noStrike" cap="none" dirty="0">
                   <a:solidFill>
-                    <a:schemeClr val="dk1"/>
+                    <a:schemeClr val="lt1"/>
                   </a:solidFill>
                   <a:latin typeface="Calibri"/>
                   <a:ea typeface="Calibri"/>
                   <a:cs typeface="Calibri"/>
                   <a:sym typeface="Calibri"/>
                 </a:rPr>
-                <a:t>Gravity </a:t>
+                <a:t>Food Insecurity Diagnosis ICD10CM</a:t>
               </a:r>
+              <a:endParaRPr sz="1050" dirty="0"/>
             </a:p>
+          </p:txBody>
+        </p:sp>
+        <p:sp>
+          <p:nvSpPr>
+            <p:cNvPr id="136" name="Google Shape;136;p26"/>
+            <p:cNvSpPr/>
+            <p:nvPr/>
+          </p:nvSpPr>
+          <p:spPr>
+            <a:xfrm>
+              <a:off x="1447797" y="2508708"/>
+              <a:ext cx="1456331" cy="411654"/>
+            </a:xfrm>
+            <a:prstGeom prst="rect">
+              <a:avLst/>
+            </a:prstGeom>
+            <a:solidFill>
+              <a:schemeClr val="accent1"/>
+            </a:solidFill>
+            <a:ln w="12700" cap="flat" cmpd="sng">
+              <a:solidFill>
+                <a:srgbClr val="42719B"/>
+              </a:solidFill>
+              <a:prstDash val="solid"/>
+              <a:miter lim="800000"/>
+              <a:headEnd type="none" w="sm" len="sm"/>
+              <a:tailEnd type="none" w="sm" len="sm"/>
+            </a:ln>
+          </p:spPr>
+          <p:txBody>
+            <a:bodyPr spcFirstLastPara="1" wrap="square" lIns="68575" tIns="34275" rIns="68575" bIns="34275" anchor="ctr" anchorCtr="0">
+              <a:noAutofit/>
+            </a:bodyPr>
+            <a:lstStyle/>
             <a:p>
-              <a:pPr marL="0" marR="0" lvl="0" indent="0" algn="r" rtl="0">
+              <a:pPr marL="0" marR="0" lvl="0" indent="0" algn="ctr" rtl="0">
                 <a:spcBef>
                   <a:spcPts val="0"/>
                 </a:spcBef>
@@ -11125,630 +11241,241 @@
                 <a:buNone/>
               </a:pPr>
               <a:r>
-                <a:rPr lang="en" b="1" i="0" u="none" strike="noStrike" cap="none" dirty="0">
+                <a:rPr lang="en" sz="1050" b="0" i="0" u="none" strike="noStrike" cap="none" dirty="0">
                   <a:solidFill>
-                    <a:schemeClr val="dk1"/>
+                    <a:schemeClr val="lt1"/>
                   </a:solidFill>
                   <a:latin typeface="Calibri"/>
                   <a:ea typeface="Calibri"/>
                   <a:cs typeface="Calibri"/>
                   <a:sym typeface="Calibri"/>
                 </a:rPr>
-                <a:t>SDOH Condition Domains</a:t>
+                <a:t>Inadequate Housing Insecurity </a:t>
               </a:r>
-              <a:endParaRPr dirty="0"/>
-            </a:p>
-          </p:txBody>
-        </p:sp>
-        <p:grpSp>
-          <p:nvGrpSpPr>
-            <p:cNvPr id="11" name="Group 10">
-              <a:extLst>
-                <a:ext uri="{FF2B5EF4-FFF2-40B4-BE49-F238E27FC236}">
-                  <a16:creationId xmlns:a16="http://schemas.microsoft.com/office/drawing/2014/main" id="{ED732215-184E-A581-5481-A721592C3BA5}"/>
-                </a:ext>
-              </a:extLst>
-            </p:cNvPr>
-            <p:cNvGrpSpPr/>
-            <p:nvPr/>
-          </p:nvGrpSpPr>
-          <p:grpSpPr>
-            <a:xfrm>
-              <a:off x="963716" y="1298002"/>
-              <a:ext cx="4267506" cy="2845766"/>
-              <a:chOff x="963716" y="1298002"/>
-              <a:chExt cx="4267506" cy="2845766"/>
-            </a:xfrm>
-          </p:grpSpPr>
-          <p:sp>
-            <p:nvSpPr>
-              <p:cNvPr id="135" name="Google Shape;135;p26"/>
-              <p:cNvSpPr/>
-              <p:nvPr/>
-            </p:nvSpPr>
-            <p:spPr>
-              <a:xfrm>
-                <a:off x="1537808" y="1298002"/>
-                <a:ext cx="1366323" cy="411654"/>
-              </a:xfrm>
-              <a:prstGeom prst="rect">
-                <a:avLst/>
-              </a:prstGeom>
-              <a:solidFill>
-                <a:schemeClr val="accent1"/>
-              </a:solidFill>
-              <a:ln w="12700" cap="flat" cmpd="sng">
-                <a:solidFill>
-                  <a:srgbClr val="42719B"/>
-                </a:solidFill>
-                <a:prstDash val="solid"/>
-                <a:miter lim="800000"/>
-                <a:headEnd type="none" w="sm" len="sm"/>
-                <a:tailEnd type="none" w="sm" len="sm"/>
-              </a:ln>
-            </p:spPr>
-            <p:txBody>
-              <a:bodyPr spcFirstLastPara="1" wrap="square" lIns="68575" tIns="34275" rIns="68575" bIns="34275" anchor="ctr" anchorCtr="0">
-                <a:noAutofit/>
-              </a:bodyPr>
-              <a:lstStyle/>
-              <a:p>
-                <a:pPr marL="0" marR="0" lvl="0" indent="0" algn="ctr" rtl="0">
-                  <a:spcBef>
-                    <a:spcPts val="0"/>
-                  </a:spcBef>
-                  <a:spcAft>
-                    <a:spcPts val="0"/>
-                  </a:spcAft>
-                  <a:buNone/>
-                </a:pPr>
-                <a:r>
-                  <a:rPr lang="en" sz="1200" b="0" i="0" u="none" strike="noStrike" cap="none" dirty="0">
-                    <a:solidFill>
-                      <a:schemeClr val="lt1"/>
-                    </a:solidFill>
-                    <a:latin typeface="Calibri"/>
-                    <a:ea typeface="Calibri"/>
-                    <a:cs typeface="Calibri"/>
-                    <a:sym typeface="Calibri"/>
-                  </a:rPr>
-                  <a:t>ICD10 Food Insecurity</a:t>
-                </a:r>
-                <a:endParaRPr sz="1200" dirty="0"/>
-              </a:p>
-            </p:txBody>
-          </p:sp>
-          <p:sp>
-            <p:nvSpPr>
-              <p:cNvPr id="136" name="Google Shape;136;p26"/>
-              <p:cNvSpPr/>
-              <p:nvPr/>
-            </p:nvSpPr>
-            <p:spPr>
-              <a:xfrm>
-                <a:off x="1537805" y="2515058"/>
-                <a:ext cx="1366323" cy="411654"/>
-              </a:xfrm>
-              <a:prstGeom prst="rect">
-                <a:avLst/>
-              </a:prstGeom>
-              <a:solidFill>
-                <a:schemeClr val="accent1"/>
-              </a:solidFill>
-              <a:ln w="12700" cap="flat" cmpd="sng">
-                <a:solidFill>
-                  <a:srgbClr val="42719B"/>
-                </a:solidFill>
-                <a:prstDash val="solid"/>
-                <a:miter lim="800000"/>
-                <a:headEnd type="none" w="sm" len="sm"/>
-                <a:tailEnd type="none" w="sm" len="sm"/>
-              </a:ln>
-            </p:spPr>
-            <p:txBody>
-              <a:bodyPr spcFirstLastPara="1" wrap="square" lIns="68575" tIns="34275" rIns="68575" bIns="34275" anchor="ctr" anchorCtr="0">
-                <a:noAutofit/>
-              </a:bodyPr>
-              <a:lstStyle/>
-              <a:p>
-                <a:pPr marL="0" marR="0" lvl="0" indent="0" algn="ctr" rtl="0">
-                  <a:spcBef>
-                    <a:spcPts val="0"/>
-                  </a:spcBef>
-                  <a:spcAft>
-                    <a:spcPts val="0"/>
-                  </a:spcAft>
-                  <a:buNone/>
-                </a:pPr>
-                <a:r>
-                  <a:rPr lang="en" sz="1200" dirty="0">
-                    <a:solidFill>
-                      <a:schemeClr val="lt1"/>
-                    </a:solidFill>
-                    <a:latin typeface="Calibri"/>
-                    <a:ea typeface="Calibri"/>
-                    <a:cs typeface="Calibri"/>
-                    <a:sym typeface="Calibri"/>
-                  </a:rPr>
-                  <a:t>ICD10</a:t>
-                </a:r>
-                <a:r>
-                  <a:rPr lang="en" sz="1200" b="0" i="0" u="none" strike="noStrike" cap="none" dirty="0">
-                    <a:solidFill>
-                      <a:schemeClr val="lt1"/>
-                    </a:solidFill>
-                    <a:latin typeface="Calibri"/>
-                    <a:ea typeface="Calibri"/>
-                    <a:cs typeface="Calibri"/>
-                    <a:sym typeface="Calibri"/>
-                  </a:rPr>
-                  <a:t> Housing Insecurity</a:t>
-                </a:r>
-                <a:endParaRPr sz="1200" dirty="0"/>
-              </a:p>
-            </p:txBody>
-          </p:sp>
-          <p:sp>
-            <p:nvSpPr>
-              <p:cNvPr id="138" name="Google Shape;138;p26"/>
-              <p:cNvSpPr/>
-              <p:nvPr/>
-            </p:nvSpPr>
-            <p:spPr>
-              <a:xfrm>
-                <a:off x="1537806" y="3123586"/>
-                <a:ext cx="1366323" cy="411654"/>
-              </a:xfrm>
-              <a:prstGeom prst="rect">
-                <a:avLst/>
-              </a:prstGeom>
-              <a:solidFill>
-                <a:schemeClr val="accent1"/>
-              </a:solidFill>
-              <a:ln w="12700" cap="flat" cmpd="sng">
-                <a:solidFill>
-                  <a:srgbClr val="42719B"/>
-                </a:solidFill>
-                <a:prstDash val="solid"/>
-                <a:miter lim="800000"/>
-                <a:headEnd type="none" w="sm" len="sm"/>
-                <a:tailEnd type="none" w="sm" len="sm"/>
-              </a:ln>
-            </p:spPr>
-            <p:txBody>
-              <a:bodyPr spcFirstLastPara="1" wrap="square" lIns="68575" tIns="34275" rIns="68575" bIns="34275" anchor="ctr" anchorCtr="0">
-                <a:noAutofit/>
-              </a:bodyPr>
-              <a:lstStyle/>
-              <a:p>
-                <a:pPr marL="0" marR="0" lvl="0" indent="0" algn="ctr" rtl="0">
-                  <a:spcBef>
-                    <a:spcPts val="0"/>
-                  </a:spcBef>
-                  <a:spcAft>
-                    <a:spcPts val="0"/>
-                  </a:spcAft>
-                  <a:buNone/>
-                </a:pPr>
-                <a:r>
-                  <a:rPr lang="en" sz="1200" b="0" i="0" u="none" strike="noStrike" cap="none" dirty="0">
-                    <a:solidFill>
-                      <a:schemeClr val="lt1"/>
-                    </a:solidFill>
-                    <a:latin typeface="Calibri"/>
-                    <a:ea typeface="Calibri"/>
-                    <a:cs typeface="Calibri"/>
-                    <a:sym typeface="Calibri"/>
-                  </a:rPr>
-                  <a:t>SNOMED CT Housing Insecurity</a:t>
-                </a:r>
-                <a:endParaRPr sz="1200" dirty="0"/>
-              </a:p>
-            </p:txBody>
-          </p:sp>
-          <p:sp>
-            <p:nvSpPr>
-              <p:cNvPr id="139" name="Google Shape;139;p26"/>
-              <p:cNvSpPr/>
-              <p:nvPr/>
-            </p:nvSpPr>
-            <p:spPr>
-              <a:xfrm>
-                <a:off x="1537805" y="1906530"/>
-                <a:ext cx="1366323" cy="411654"/>
-              </a:xfrm>
-              <a:prstGeom prst="rect">
-                <a:avLst/>
-              </a:prstGeom>
-              <a:solidFill>
-                <a:schemeClr val="accent1"/>
-              </a:solidFill>
-              <a:ln w="12700" cap="flat" cmpd="sng">
-                <a:solidFill>
-                  <a:srgbClr val="42719B"/>
-                </a:solidFill>
-                <a:prstDash val="solid"/>
-                <a:miter lim="800000"/>
-                <a:headEnd type="none" w="sm" len="sm"/>
-                <a:tailEnd type="none" w="sm" len="sm"/>
-              </a:ln>
-            </p:spPr>
-            <p:txBody>
-              <a:bodyPr spcFirstLastPara="1" wrap="square" lIns="68575" tIns="34275" rIns="68575" bIns="34275" anchor="ctr" anchorCtr="0">
-                <a:noAutofit/>
-              </a:bodyPr>
-              <a:lstStyle/>
-              <a:p>
-                <a:pPr marL="0" marR="0" lvl="0" indent="0" algn="ctr" rtl="0">
-                  <a:spcBef>
-                    <a:spcPts val="0"/>
-                  </a:spcBef>
-                  <a:spcAft>
-                    <a:spcPts val="0"/>
-                  </a:spcAft>
-                  <a:buNone/>
-                </a:pPr>
-                <a:r>
-                  <a:rPr lang="en" sz="1200" dirty="0">
-                    <a:solidFill>
-                      <a:schemeClr val="lt1"/>
-                    </a:solidFill>
-                    <a:latin typeface="Calibri"/>
-                    <a:ea typeface="Calibri"/>
-                    <a:cs typeface="Calibri"/>
-                    <a:sym typeface="Calibri"/>
-                  </a:rPr>
-                  <a:t>SNOMED CT</a:t>
-                </a:r>
-                <a:r>
-                  <a:rPr lang="en" sz="1200" b="0" i="0" u="none" strike="noStrike" cap="none" dirty="0">
-                    <a:solidFill>
-                      <a:schemeClr val="lt1"/>
-                    </a:solidFill>
-                    <a:latin typeface="Calibri"/>
-                    <a:ea typeface="Calibri"/>
-                    <a:cs typeface="Calibri"/>
-                    <a:sym typeface="Calibri"/>
-                  </a:rPr>
-                  <a:t> Food Insecurity</a:t>
-                </a:r>
-                <a:endParaRPr sz="1200" dirty="0"/>
-              </a:p>
-            </p:txBody>
-          </p:sp>
-          <p:sp>
-            <p:nvSpPr>
-              <p:cNvPr id="140" name="Google Shape;140;p26"/>
-              <p:cNvSpPr/>
-              <p:nvPr/>
-            </p:nvSpPr>
-            <p:spPr>
-              <a:xfrm>
-                <a:off x="1537806" y="3732114"/>
-                <a:ext cx="1366323" cy="411654"/>
-              </a:xfrm>
-              <a:prstGeom prst="rect">
-                <a:avLst/>
-              </a:prstGeom>
-              <a:solidFill>
-                <a:schemeClr val="accent1"/>
-              </a:solidFill>
-              <a:ln w="12700" cap="flat" cmpd="sng">
-                <a:solidFill>
-                  <a:srgbClr val="42719B"/>
-                </a:solidFill>
-                <a:prstDash val="solid"/>
-                <a:miter lim="800000"/>
-                <a:headEnd type="none" w="sm" len="sm"/>
-                <a:tailEnd type="none" w="sm" len="sm"/>
-              </a:ln>
-            </p:spPr>
-            <p:txBody>
-              <a:bodyPr spcFirstLastPara="1" wrap="square" lIns="68575" tIns="34275" rIns="68575" bIns="34275" anchor="ctr" anchorCtr="0">
-                <a:noAutofit/>
-              </a:bodyPr>
-              <a:lstStyle/>
-              <a:p>
-                <a:pPr marL="0" marR="0" lvl="0" indent="0" algn="ctr" rtl="0">
-                  <a:spcBef>
-                    <a:spcPts val="0"/>
-                  </a:spcBef>
-                  <a:spcAft>
-                    <a:spcPts val="0"/>
-                  </a:spcAft>
-                  <a:buNone/>
-                </a:pPr>
-                <a:r>
-                  <a:rPr lang="en" sz="1200" dirty="0">
-                    <a:solidFill>
-                      <a:schemeClr val="lt1"/>
-                    </a:solidFill>
-                    <a:latin typeface="Calibri"/>
-                    <a:ea typeface="Calibri"/>
-                    <a:cs typeface="Calibri"/>
-                    <a:sym typeface="Calibri"/>
-                  </a:rPr>
-                  <a:t>Additional Domains</a:t>
-                </a:r>
-                <a:endParaRPr sz="1200" dirty="0"/>
-              </a:p>
-            </p:txBody>
-          </p:sp>
-          <p:sp>
-            <p:nvSpPr>
-              <p:cNvPr id="141" name="Google Shape;141;p26"/>
-              <p:cNvSpPr/>
-              <p:nvPr/>
-            </p:nvSpPr>
-            <p:spPr>
-              <a:xfrm>
-                <a:off x="3864899" y="2014129"/>
-                <a:ext cx="1366323" cy="1413364"/>
-              </a:xfrm>
-              <a:prstGeom prst="ellipse">
-                <a:avLst/>
-              </a:prstGeom>
-              <a:solidFill>
-                <a:schemeClr val="accent1"/>
-              </a:solidFill>
-              <a:ln w="12700" cap="flat" cmpd="sng">
-                <a:solidFill>
-                  <a:srgbClr val="42719B"/>
-                </a:solidFill>
-                <a:prstDash val="solid"/>
-                <a:miter lim="800000"/>
-                <a:headEnd type="none" w="sm" len="sm"/>
-                <a:tailEnd type="none" w="sm" len="sm"/>
-              </a:ln>
-            </p:spPr>
-            <p:txBody>
-              <a:bodyPr spcFirstLastPara="1" wrap="square" lIns="68575" tIns="34275" rIns="68575" bIns="34275" anchor="ctr" anchorCtr="0">
-                <a:noAutofit/>
-              </a:bodyPr>
-              <a:lstStyle/>
-              <a:p>
-                <a:pPr marL="0" marR="0" lvl="0" indent="0" algn="ctr" rtl="0">
-                  <a:spcBef>
-                    <a:spcPts val="0"/>
-                  </a:spcBef>
-                  <a:spcAft>
-                    <a:spcPts val="0"/>
-                  </a:spcAft>
-                  <a:buNone/>
-                </a:pPr>
-                <a:r>
-                  <a:rPr lang="en" b="1" i="0" u="none" strike="noStrike" cap="none" dirty="0">
-                    <a:solidFill>
-                      <a:schemeClr val="lt1"/>
-                    </a:solidFill>
-                    <a:latin typeface="Calibri"/>
-                    <a:ea typeface="Calibri"/>
-                    <a:cs typeface="Calibri"/>
-                    <a:sym typeface="Calibri"/>
-                  </a:rPr>
-                  <a:t>SDOH Conditions Group Value Set</a:t>
-                </a:r>
-                <a:endParaRPr b="1" dirty="0"/>
-              </a:p>
-            </p:txBody>
-          </p:sp>
-          <p:cxnSp>
-            <p:nvCxnSpPr>
-              <p:cNvPr id="142" name="Google Shape;142;p26"/>
-              <p:cNvCxnSpPr>
-                <a:cxnSpLocks/>
-                <a:stCxn id="135" idx="3"/>
-              </p:cNvCxnSpPr>
-              <p:nvPr/>
-            </p:nvCxnSpPr>
-            <p:spPr>
-              <a:xfrm>
-                <a:off x="2904130" y="1503829"/>
-                <a:ext cx="960769" cy="1216982"/>
-              </a:xfrm>
-              <a:prstGeom prst="straightConnector1">
-                <a:avLst/>
-              </a:prstGeom>
-              <a:noFill/>
-              <a:ln w="38100" cap="flat" cmpd="sng">
-                <a:solidFill>
-                  <a:schemeClr val="accent1"/>
-                </a:solidFill>
-                <a:prstDash val="solid"/>
-                <a:miter lim="800000"/>
-                <a:headEnd type="none" w="sm" len="sm"/>
-                <a:tailEnd type="none" w="med" len="med"/>
-              </a:ln>
-            </p:spPr>
-          </p:cxnSp>
-          <p:cxnSp>
-            <p:nvCxnSpPr>
-              <p:cNvPr id="143" name="Google Shape;143;p26"/>
-              <p:cNvCxnSpPr>
-                <a:cxnSpLocks/>
-                <a:stCxn id="136" idx="3"/>
-              </p:cNvCxnSpPr>
-              <p:nvPr/>
-            </p:nvCxnSpPr>
-            <p:spPr>
-              <a:xfrm flipV="1">
-                <a:off x="2904128" y="2720811"/>
-                <a:ext cx="960771" cy="74"/>
-              </a:xfrm>
-              <a:prstGeom prst="straightConnector1">
-                <a:avLst/>
-              </a:prstGeom>
-              <a:noFill/>
-              <a:ln w="38100" cap="flat" cmpd="sng">
-                <a:solidFill>
-                  <a:schemeClr val="accent1"/>
-                </a:solidFill>
-                <a:prstDash val="solid"/>
-                <a:miter lim="800000"/>
-                <a:headEnd type="none" w="sm" len="sm"/>
-                <a:tailEnd type="none" w="med" len="med"/>
-              </a:ln>
-            </p:spPr>
-          </p:cxnSp>
-          <p:cxnSp>
-            <p:nvCxnSpPr>
-              <p:cNvPr id="144" name="Google Shape;144;p26"/>
-              <p:cNvCxnSpPr>
-                <a:cxnSpLocks/>
-                <a:stCxn id="139" idx="3"/>
-              </p:cNvCxnSpPr>
-              <p:nvPr/>
-            </p:nvCxnSpPr>
-            <p:spPr>
-              <a:xfrm>
-                <a:off x="2904128" y="2112357"/>
-                <a:ext cx="960771" cy="608454"/>
-              </a:xfrm>
-              <a:prstGeom prst="straightConnector1">
-                <a:avLst/>
-              </a:prstGeom>
-              <a:noFill/>
-              <a:ln w="38100" cap="flat" cmpd="sng">
-                <a:solidFill>
-                  <a:schemeClr val="accent1"/>
-                </a:solidFill>
-                <a:prstDash val="solid"/>
-                <a:miter lim="800000"/>
-                <a:headEnd type="none" w="sm" len="sm"/>
-                <a:tailEnd type="none" w="med" len="med"/>
-              </a:ln>
-            </p:spPr>
-          </p:cxnSp>
-          <p:cxnSp>
-            <p:nvCxnSpPr>
-              <p:cNvPr id="145" name="Google Shape;145;p26"/>
-              <p:cNvCxnSpPr>
-                <a:cxnSpLocks/>
-                <a:stCxn id="138" idx="3"/>
-              </p:cNvCxnSpPr>
-              <p:nvPr/>
-            </p:nvCxnSpPr>
-            <p:spPr>
-              <a:xfrm flipV="1">
-                <a:off x="2904129" y="2720811"/>
-                <a:ext cx="960771" cy="608602"/>
-              </a:xfrm>
-              <a:prstGeom prst="straightConnector1">
-                <a:avLst/>
-              </a:prstGeom>
-              <a:noFill/>
-              <a:ln w="38100" cap="flat" cmpd="sng">
-                <a:solidFill>
-                  <a:schemeClr val="accent1"/>
-                </a:solidFill>
-                <a:prstDash val="solid"/>
-                <a:miter lim="800000"/>
-                <a:headEnd type="none" w="sm" len="sm"/>
-                <a:tailEnd type="none" w="med" len="med"/>
-              </a:ln>
-            </p:spPr>
-          </p:cxnSp>
-          <p:cxnSp>
-            <p:nvCxnSpPr>
-              <p:cNvPr id="146" name="Google Shape;146;p26"/>
-              <p:cNvCxnSpPr>
-                <a:cxnSpLocks/>
-                <a:stCxn id="140" idx="3"/>
-              </p:cNvCxnSpPr>
-              <p:nvPr/>
-            </p:nvCxnSpPr>
-            <p:spPr>
-              <a:xfrm flipV="1">
-                <a:off x="2904129" y="2720811"/>
-                <a:ext cx="960771" cy="1217130"/>
-              </a:xfrm>
-              <a:prstGeom prst="straightConnector1">
-                <a:avLst/>
-              </a:prstGeom>
-              <a:noFill/>
-              <a:ln w="38100" cap="flat" cmpd="sng">
-                <a:solidFill>
-                  <a:schemeClr val="accent1"/>
-                </a:solidFill>
-                <a:prstDash val="solid"/>
-                <a:miter lim="800000"/>
-                <a:headEnd type="none" w="sm" len="sm"/>
-                <a:tailEnd type="none" w="med" len="med"/>
-              </a:ln>
-            </p:spPr>
-          </p:cxnSp>
-          <p:sp>
-            <p:nvSpPr>
-              <p:cNvPr id="149" name="Google Shape;149;p26"/>
-              <p:cNvSpPr/>
-              <p:nvPr/>
-            </p:nvSpPr>
-            <p:spPr>
-              <a:xfrm>
-                <a:off x="963716" y="1308231"/>
-                <a:ext cx="403491" cy="2835537"/>
-              </a:xfrm>
-              <a:prstGeom prst="leftBrace">
-                <a:avLst>
-                  <a:gd name="adj1" fmla="val 8333"/>
-                  <a:gd name="adj2" fmla="val 50000"/>
-                </a:avLst>
-              </a:prstGeom>
-              <a:noFill/>
-              <a:ln w="38100" cap="flat" cmpd="sng">
-                <a:solidFill>
-                  <a:schemeClr val="accent1"/>
-                </a:solidFill>
-                <a:prstDash val="solid"/>
-                <a:miter lim="800000"/>
-                <a:headEnd type="none" w="sm" len="sm"/>
-                <a:tailEnd type="none" w="sm" len="sm"/>
-              </a:ln>
-            </p:spPr>
-            <p:txBody>
-              <a:bodyPr spcFirstLastPara="1" wrap="square" lIns="68575" tIns="34275" rIns="68575" bIns="34275" anchor="ctr" anchorCtr="0">
-                <a:noAutofit/>
-              </a:bodyPr>
-              <a:lstStyle/>
-              <a:p>
-                <a:pPr marL="0" marR="0" lvl="0" indent="0" algn="ctr" rtl="0">
-                  <a:spcBef>
-                    <a:spcPts val="0"/>
-                  </a:spcBef>
-                  <a:spcAft>
-                    <a:spcPts val="0"/>
-                  </a:spcAft>
-                  <a:buNone/>
-                </a:pPr>
-                <a:endParaRPr sz="1400" b="0" i="0" u="none" strike="noStrike" cap="none">
+              <a:r>
+                <a:rPr lang="en" sz="1050" dirty="0">
                   <a:solidFill>
-                    <a:schemeClr val="dk1"/>
+                    <a:schemeClr val="lt1"/>
                   </a:solidFill>
                   <a:latin typeface="Calibri"/>
                   <a:ea typeface="Calibri"/>
                   <a:cs typeface="Calibri"/>
                   <a:sym typeface="Calibri"/>
-                </a:endParaRPr>
-              </a:p>
-            </p:txBody>
-          </p:sp>
-        </p:grpSp>
+                </a:rPr>
+                <a:t>ICD10CM</a:t>
+              </a:r>
+              <a:endParaRPr sz="1050" dirty="0"/>
+            </a:p>
+          </p:txBody>
+        </p:sp>
         <p:sp>
           <p:nvSpPr>
-            <p:cNvPr id="2" name="Google Shape;141;p26">
-              <a:extLst>
-                <a:ext uri="{FF2B5EF4-FFF2-40B4-BE49-F238E27FC236}">
-                  <a16:creationId xmlns:a16="http://schemas.microsoft.com/office/drawing/2014/main" id="{8DC9D7C3-BE9F-6D81-A1D0-D93AE5834F5D}"/>
-                </a:ext>
-              </a:extLst>
-            </p:cNvPr>
+            <p:cNvPr id="138" name="Google Shape;138;p26"/>
             <p:cNvSpPr/>
             <p:nvPr/>
           </p:nvSpPr>
           <p:spPr>
             <a:xfrm>
-              <a:off x="6239873" y="1463639"/>
-              <a:ext cx="2554227" cy="2514493"/>
+              <a:off x="1447798" y="3117236"/>
+              <a:ext cx="1456331" cy="411654"/>
+            </a:xfrm>
+            <a:prstGeom prst="rect">
+              <a:avLst/>
+            </a:prstGeom>
+            <a:solidFill>
+              <a:schemeClr val="accent1"/>
+            </a:solidFill>
+            <a:ln w="12700" cap="flat" cmpd="sng">
+              <a:solidFill>
+                <a:srgbClr val="42719B"/>
+              </a:solidFill>
+              <a:prstDash val="solid"/>
+              <a:miter lim="800000"/>
+              <a:headEnd type="none" w="sm" len="sm"/>
+              <a:tailEnd type="none" w="sm" len="sm"/>
+            </a:ln>
+          </p:spPr>
+          <p:txBody>
+            <a:bodyPr spcFirstLastPara="1" wrap="square" lIns="68575" tIns="34275" rIns="68575" bIns="34275" anchor="ctr" anchorCtr="0">
+              <a:noAutofit/>
+            </a:bodyPr>
+            <a:lstStyle/>
+            <a:p>
+              <a:pPr marL="0" marR="0" lvl="0" indent="0" algn="ctr" rtl="0">
+                <a:spcBef>
+                  <a:spcPts val="0"/>
+                </a:spcBef>
+                <a:spcAft>
+                  <a:spcPts val="0"/>
+                </a:spcAft>
+                <a:buNone/>
+              </a:pPr>
+              <a:r>
+                <a:rPr lang="en" sz="1050" b="0" i="0" u="none" strike="noStrike" cap="none" dirty="0">
+                  <a:solidFill>
+                    <a:schemeClr val="lt1"/>
+                  </a:solidFill>
+                  <a:latin typeface="Calibri"/>
+                  <a:ea typeface="Calibri"/>
+                  <a:cs typeface="Calibri"/>
+                  <a:sym typeface="Calibri"/>
+                </a:rPr>
+                <a:t>Inadequate Housing Insecurity SNOMED CT</a:t>
+              </a:r>
+              <a:endParaRPr sz="1050" dirty="0"/>
+            </a:p>
+          </p:txBody>
+        </p:sp>
+        <p:sp>
+          <p:nvSpPr>
+            <p:cNvPr id="139" name="Google Shape;139;p26"/>
+            <p:cNvSpPr/>
+            <p:nvPr/>
+          </p:nvSpPr>
+          <p:spPr>
+            <a:xfrm>
+              <a:off x="1447797" y="1900180"/>
+              <a:ext cx="1456331" cy="411654"/>
+            </a:xfrm>
+            <a:prstGeom prst="rect">
+              <a:avLst/>
+            </a:prstGeom>
+            <a:solidFill>
+              <a:schemeClr val="accent1"/>
+            </a:solidFill>
+            <a:ln w="12700" cap="flat" cmpd="sng">
+              <a:solidFill>
+                <a:srgbClr val="42719B"/>
+              </a:solidFill>
+              <a:prstDash val="solid"/>
+              <a:miter lim="800000"/>
+              <a:headEnd type="none" w="sm" len="sm"/>
+              <a:tailEnd type="none" w="sm" len="sm"/>
+            </a:ln>
+          </p:spPr>
+          <p:txBody>
+            <a:bodyPr spcFirstLastPara="1" wrap="square" lIns="68575" tIns="34275" rIns="68575" bIns="34275" anchor="ctr" anchorCtr="0">
+              <a:noAutofit/>
+            </a:bodyPr>
+            <a:lstStyle/>
+            <a:p>
+              <a:pPr marL="0" marR="0" lvl="0" indent="0" algn="ctr" rtl="0">
+                <a:spcBef>
+                  <a:spcPts val="0"/>
+                </a:spcBef>
+                <a:spcAft>
+                  <a:spcPts val="0"/>
+                </a:spcAft>
+                <a:buNone/>
+              </a:pPr>
+              <a:r>
+                <a:rPr lang="en" sz="1050" b="0" i="0" u="none" strike="noStrike" cap="none" dirty="0">
+                  <a:solidFill>
+                    <a:schemeClr val="lt1"/>
+                  </a:solidFill>
+                  <a:latin typeface="Calibri"/>
+                  <a:ea typeface="Calibri"/>
+                  <a:cs typeface="Calibri"/>
+                  <a:sym typeface="Calibri"/>
+                </a:rPr>
+                <a:t>Food Insecurity Diagnosis </a:t>
+              </a:r>
+              <a:r>
+                <a:rPr lang="en" sz="1050" dirty="0">
+                  <a:solidFill>
+                    <a:schemeClr val="lt1"/>
+                  </a:solidFill>
+                  <a:latin typeface="Calibri"/>
+                  <a:ea typeface="Calibri"/>
+                  <a:cs typeface="Calibri"/>
+                  <a:sym typeface="Calibri"/>
+                </a:rPr>
+                <a:t>SNOMED CT</a:t>
+              </a:r>
+              <a:r>
+                <a:rPr lang="en" sz="1050" b="0" i="0" u="none" strike="noStrike" cap="none" dirty="0">
+                  <a:solidFill>
+                    <a:schemeClr val="lt1"/>
+                  </a:solidFill>
+                  <a:latin typeface="Calibri"/>
+                  <a:ea typeface="Calibri"/>
+                  <a:cs typeface="Calibri"/>
+                  <a:sym typeface="Calibri"/>
+                </a:rPr>
+                <a:t> </a:t>
+              </a:r>
+              <a:endParaRPr sz="1050" dirty="0"/>
+            </a:p>
+          </p:txBody>
+        </p:sp>
+        <p:sp>
+          <p:nvSpPr>
+            <p:cNvPr id="140" name="Google Shape;140;p26"/>
+            <p:cNvSpPr/>
+            <p:nvPr/>
+          </p:nvSpPr>
+          <p:spPr>
+            <a:xfrm>
+              <a:off x="1447798" y="3725764"/>
+              <a:ext cx="1456331" cy="411654"/>
+            </a:xfrm>
+            <a:prstGeom prst="rect">
+              <a:avLst/>
+            </a:prstGeom>
+            <a:solidFill>
+              <a:schemeClr val="accent1"/>
+            </a:solidFill>
+            <a:ln w="12700" cap="flat" cmpd="sng">
+              <a:solidFill>
+                <a:srgbClr val="42719B"/>
+              </a:solidFill>
+              <a:prstDash val="solid"/>
+              <a:miter lim="800000"/>
+              <a:headEnd type="none" w="sm" len="sm"/>
+              <a:tailEnd type="none" w="sm" len="sm"/>
+            </a:ln>
+          </p:spPr>
+          <p:txBody>
+            <a:bodyPr spcFirstLastPara="1" wrap="square" lIns="68575" tIns="34275" rIns="68575" bIns="34275" anchor="ctr" anchorCtr="0">
+              <a:noAutofit/>
+            </a:bodyPr>
+            <a:lstStyle/>
+            <a:p>
+              <a:pPr marL="0" marR="0" lvl="0" indent="0" algn="ctr" rtl="0">
+                <a:spcBef>
+                  <a:spcPts val="0"/>
+                </a:spcBef>
+                <a:spcAft>
+                  <a:spcPts val="0"/>
+                </a:spcAft>
+                <a:buNone/>
+              </a:pPr>
+              <a:r>
+                <a:rPr lang="en" sz="1050" dirty="0">
+                  <a:solidFill>
+                    <a:schemeClr val="lt1"/>
+                  </a:solidFill>
+                  <a:latin typeface="Calibri"/>
+                  <a:ea typeface="Calibri"/>
+                  <a:cs typeface="Calibri"/>
+                  <a:sym typeface="Calibri"/>
+                </a:rPr>
+                <a:t>Additional Domains</a:t>
+              </a:r>
+              <a:endParaRPr sz="1050" dirty="0"/>
+            </a:p>
+          </p:txBody>
+        </p:sp>
+        <p:sp>
+          <p:nvSpPr>
+            <p:cNvPr id="141" name="Google Shape;141;p26"/>
+            <p:cNvSpPr/>
+            <p:nvPr/>
+          </p:nvSpPr>
+          <p:spPr>
+            <a:xfrm>
+              <a:off x="3864899" y="2014129"/>
+              <a:ext cx="1366323" cy="1413364"/>
             </a:xfrm>
             <a:prstGeom prst="ellipse">
               <a:avLst/>
@@ -11772,51 +11499,6 @@
             </a:bodyPr>
             <a:lstStyle/>
             <a:p>
-              <a:pPr algn="ctr"/>
-              <a:r>
-                <a:rPr lang="en-US" sz="1400" b="1" i="1" dirty="0">
-                  <a:solidFill>
-                    <a:schemeClr val="bg1"/>
-                  </a:solidFill>
-                  <a:latin typeface="Calibri"/>
-                  <a:ea typeface="Calibri"/>
-                  <a:cs typeface="Calibri"/>
-                  <a:sym typeface="Calibri"/>
-                </a:rPr>
-                <a:t>US Core</a:t>
-              </a:r>
-              <a:r>
-                <a:rPr lang="en-US" sz="1400" b="1" i="1" u="none" strike="noStrike" cap="none" dirty="0">
-                  <a:solidFill>
-                    <a:schemeClr val="bg1"/>
-                  </a:solidFill>
-                  <a:latin typeface="Calibri"/>
-                  <a:ea typeface="Calibri"/>
-                  <a:cs typeface="Calibri"/>
-                  <a:sym typeface="Calibri"/>
-                </a:rPr>
-                <a:t> Condition Problem and Health Concerns Profile </a:t>
-              </a:r>
-              <a:r>
-                <a:rPr lang="en-US" sz="1400" b="1" u="none" strike="noStrike" cap="none" dirty="0">
-                  <a:solidFill>
-                    <a:schemeClr val="bg1"/>
-                  </a:solidFill>
-                  <a:latin typeface="Calibri"/>
-                  <a:ea typeface="Calibri"/>
-                  <a:cs typeface="Calibri"/>
-                  <a:sym typeface="Calibri"/>
-                </a:rPr>
-                <a:t>Condition Codes:</a:t>
-              </a:r>
-              <a:endParaRPr lang="en-US" sz="1400" dirty="0">
-                <a:solidFill>
-                  <a:schemeClr val="bg1"/>
-                </a:solidFill>
-                <a:latin typeface="Courier" pitchFamily="2" charset="0"/>
-              </a:endParaRPr>
-            </a:p>
-            <a:p>
               <a:pPr marL="0" marR="0" lvl="0" indent="0" algn="ctr" rtl="0">
                 <a:spcBef>
                   <a:spcPts val="0"/>
@@ -11836,59 +11518,368 @@
                   <a:cs typeface="Calibri"/>
                   <a:sym typeface="Calibri"/>
                 </a:rPr>
-                <a:t>ICD10, ICD9, SNOMED CT</a:t>
+                <a:t>SDOH Conditions Group Value Set</a:t>
               </a:r>
               <a:endParaRPr b="1" dirty="0"/>
             </a:p>
           </p:txBody>
         </p:sp>
+        <p:cxnSp>
+          <p:nvCxnSpPr>
+            <p:cNvPr id="142" name="Google Shape;142;p26"/>
+            <p:cNvCxnSpPr>
+              <a:cxnSpLocks/>
+              <a:stCxn id="135" idx="3"/>
+            </p:cNvCxnSpPr>
+            <p:nvPr/>
+          </p:nvCxnSpPr>
+          <p:spPr>
+            <a:xfrm>
+              <a:off x="2904131" y="1497479"/>
+              <a:ext cx="960768" cy="1216982"/>
+            </a:xfrm>
+            <a:prstGeom prst="straightConnector1">
+              <a:avLst/>
+            </a:prstGeom>
+            <a:noFill/>
+            <a:ln w="38100" cap="flat" cmpd="sng">
+              <a:solidFill>
+                <a:schemeClr val="accent1"/>
+              </a:solidFill>
+              <a:prstDash val="solid"/>
+              <a:miter lim="800000"/>
+              <a:headEnd type="none" w="sm" len="sm"/>
+              <a:tailEnd type="none" w="med" len="med"/>
+            </a:ln>
+          </p:spPr>
+        </p:cxnSp>
+        <p:cxnSp>
+          <p:nvCxnSpPr>
+            <p:cNvPr id="143" name="Google Shape;143;p26"/>
+            <p:cNvCxnSpPr>
+              <a:cxnSpLocks/>
+              <a:stCxn id="136" idx="3"/>
+            </p:cNvCxnSpPr>
+            <p:nvPr/>
+          </p:nvCxnSpPr>
+          <p:spPr>
+            <a:xfrm flipV="1">
+              <a:off x="2904128" y="2714461"/>
+              <a:ext cx="960771" cy="74"/>
+            </a:xfrm>
+            <a:prstGeom prst="straightConnector1">
+              <a:avLst/>
+            </a:prstGeom>
+            <a:noFill/>
+            <a:ln w="38100" cap="flat" cmpd="sng">
+              <a:solidFill>
+                <a:schemeClr val="accent1"/>
+              </a:solidFill>
+              <a:prstDash val="solid"/>
+              <a:miter lim="800000"/>
+              <a:headEnd type="none" w="sm" len="sm"/>
+              <a:tailEnd type="none" w="med" len="med"/>
+            </a:ln>
+          </p:spPr>
+        </p:cxnSp>
+        <p:cxnSp>
+          <p:nvCxnSpPr>
+            <p:cNvPr id="144" name="Google Shape;144;p26"/>
+            <p:cNvCxnSpPr>
+              <a:cxnSpLocks/>
+              <a:stCxn id="139" idx="3"/>
+            </p:cNvCxnSpPr>
+            <p:nvPr/>
+          </p:nvCxnSpPr>
+          <p:spPr>
+            <a:xfrm>
+              <a:off x="2904128" y="2106007"/>
+              <a:ext cx="960771" cy="608454"/>
+            </a:xfrm>
+            <a:prstGeom prst="straightConnector1">
+              <a:avLst/>
+            </a:prstGeom>
+            <a:noFill/>
+            <a:ln w="38100" cap="flat" cmpd="sng">
+              <a:solidFill>
+                <a:schemeClr val="accent1"/>
+              </a:solidFill>
+              <a:prstDash val="solid"/>
+              <a:miter lim="800000"/>
+              <a:headEnd type="none" w="sm" len="sm"/>
+              <a:tailEnd type="none" w="med" len="med"/>
+            </a:ln>
+          </p:spPr>
+        </p:cxnSp>
+        <p:cxnSp>
+          <p:nvCxnSpPr>
+            <p:cNvPr id="145" name="Google Shape;145;p26"/>
+            <p:cNvCxnSpPr>
+              <a:cxnSpLocks/>
+              <a:stCxn id="138" idx="3"/>
+            </p:cNvCxnSpPr>
+            <p:nvPr/>
+          </p:nvCxnSpPr>
+          <p:spPr>
+            <a:xfrm flipV="1">
+              <a:off x="2904129" y="2714461"/>
+              <a:ext cx="960771" cy="608602"/>
+            </a:xfrm>
+            <a:prstGeom prst="straightConnector1">
+              <a:avLst/>
+            </a:prstGeom>
+            <a:noFill/>
+            <a:ln w="38100" cap="flat" cmpd="sng">
+              <a:solidFill>
+                <a:schemeClr val="accent1"/>
+              </a:solidFill>
+              <a:prstDash val="solid"/>
+              <a:miter lim="800000"/>
+              <a:headEnd type="none" w="sm" len="sm"/>
+              <a:tailEnd type="none" w="med" len="med"/>
+            </a:ln>
+          </p:spPr>
+        </p:cxnSp>
+        <p:cxnSp>
+          <p:nvCxnSpPr>
+            <p:cNvPr id="146" name="Google Shape;146;p26"/>
+            <p:cNvCxnSpPr>
+              <a:cxnSpLocks/>
+              <a:stCxn id="140" idx="3"/>
+            </p:cNvCxnSpPr>
+            <p:nvPr/>
+          </p:nvCxnSpPr>
+          <p:spPr>
+            <a:xfrm flipV="1">
+              <a:off x="2904129" y="2714461"/>
+              <a:ext cx="960771" cy="1217130"/>
+            </a:xfrm>
+            <a:prstGeom prst="straightConnector1">
+              <a:avLst/>
+            </a:prstGeom>
+            <a:noFill/>
+            <a:ln w="38100" cap="flat" cmpd="sng">
+              <a:solidFill>
+                <a:schemeClr val="accent1"/>
+              </a:solidFill>
+              <a:prstDash val="solid"/>
+              <a:miter lim="800000"/>
+              <a:headEnd type="none" w="sm" len="sm"/>
+              <a:tailEnd type="none" w="med" len="med"/>
+            </a:ln>
+          </p:spPr>
+        </p:cxnSp>
         <p:sp>
           <p:nvSpPr>
-            <p:cNvPr id="10" name="Right Arrow 9">
-              <a:extLst>
-                <a:ext uri="{FF2B5EF4-FFF2-40B4-BE49-F238E27FC236}">
-                  <a16:creationId xmlns:a16="http://schemas.microsoft.com/office/drawing/2014/main" id="{23069A2E-F071-409D-34F8-8333EC6FDEC5}"/>
-                </a:ext>
-              </a:extLst>
-            </p:cNvPr>
+            <p:cNvPr id="149" name="Google Shape;149;p26"/>
             <p:cNvSpPr/>
             <p:nvPr/>
           </p:nvSpPr>
           <p:spPr>
             <a:xfrm>
-              <a:off x="5462044" y="2543404"/>
-              <a:ext cx="547007" cy="354962"/>
+              <a:off x="963716" y="1308231"/>
+              <a:ext cx="403491" cy="2835537"/>
             </a:xfrm>
-            <a:prstGeom prst="rightArrow">
-              <a:avLst/>
+            <a:prstGeom prst="leftBrace">
+              <a:avLst>
+                <a:gd name="adj1" fmla="val 8333"/>
+                <a:gd name="adj2" fmla="val 50000"/>
+              </a:avLst>
             </a:prstGeom>
+            <a:noFill/>
+            <a:ln w="38100" cap="flat" cmpd="sng">
+              <a:solidFill>
+                <a:schemeClr val="accent1"/>
+              </a:solidFill>
+              <a:prstDash val="solid"/>
+              <a:miter lim="800000"/>
+              <a:headEnd type="none" w="sm" len="sm"/>
+              <a:tailEnd type="none" w="sm" len="sm"/>
+            </a:ln>
           </p:spPr>
-          <p:style>
-            <a:lnRef idx="2">
-              <a:schemeClr val="accent1">
-                <a:shade val="50000"/>
-              </a:schemeClr>
-            </a:lnRef>
-            <a:fillRef idx="1">
-              <a:schemeClr val="accent1"/>
-            </a:fillRef>
-            <a:effectRef idx="0">
-              <a:schemeClr val="accent1"/>
-            </a:effectRef>
-            <a:fontRef idx="minor">
-              <a:schemeClr val="lt1"/>
-            </a:fontRef>
-          </p:style>
           <p:txBody>
-            <a:bodyPr rtlCol="0" anchor="ctr"/>
+            <a:bodyPr spcFirstLastPara="1" wrap="square" lIns="68575" tIns="34275" rIns="68575" bIns="34275" anchor="ctr" anchorCtr="0">
+              <a:noAutofit/>
+            </a:bodyPr>
             <a:lstStyle/>
             <a:p>
-              <a:pPr algn="ctr"/>
-              <a:endParaRPr lang="en-US"/>
+              <a:pPr marL="0" marR="0" lvl="0" indent="0" algn="ctr" rtl="0">
+                <a:spcBef>
+                  <a:spcPts val="0"/>
+                </a:spcBef>
+                <a:spcAft>
+                  <a:spcPts val="0"/>
+                </a:spcAft>
+                <a:buNone/>
+              </a:pPr>
+              <a:endParaRPr sz="1400" b="0" i="0" u="none" strike="noStrike" cap="none">
+                <a:solidFill>
+                  <a:schemeClr val="dk1"/>
+                </a:solidFill>
+                <a:latin typeface="Calibri"/>
+                <a:ea typeface="Calibri"/>
+                <a:cs typeface="Calibri"/>
+                <a:sym typeface="Calibri"/>
+              </a:endParaRPr>
             </a:p>
           </p:txBody>
         </p:sp>
       </p:grpSp>
+      <p:sp>
+        <p:nvSpPr>
+          <p:cNvPr id="2" name="Google Shape;141;p26">
+            <a:extLst>
+              <a:ext uri="{FF2B5EF4-FFF2-40B4-BE49-F238E27FC236}">
+                <a16:creationId xmlns:a16="http://schemas.microsoft.com/office/drawing/2014/main" id="{8DC9D7C3-BE9F-6D81-A1D0-D93AE5834F5D}"/>
+              </a:ext>
+            </a:extLst>
+          </p:cNvPr>
+          <p:cNvSpPr/>
+          <p:nvPr/>
+        </p:nvSpPr>
+        <p:spPr>
+          <a:xfrm>
+            <a:off x="6160463" y="1294403"/>
+            <a:ext cx="2853653" cy="2849321"/>
+          </a:xfrm>
+          <a:prstGeom prst="ellipse">
+            <a:avLst/>
+          </a:prstGeom>
+          <a:solidFill>
+            <a:schemeClr val="accent1"/>
+          </a:solidFill>
+          <a:ln w="12700" cap="flat" cmpd="sng">
+            <a:solidFill>
+              <a:srgbClr val="42719B"/>
+            </a:solidFill>
+            <a:prstDash val="solid"/>
+            <a:miter lim="800000"/>
+            <a:headEnd type="none" w="sm" len="sm"/>
+            <a:tailEnd type="none" w="sm" len="sm"/>
+          </a:ln>
+        </p:spPr>
+        <p:txBody>
+          <a:bodyPr spcFirstLastPara="1" wrap="square" lIns="68575" tIns="34275" rIns="68575" bIns="34275" anchor="ctr" anchorCtr="0">
+            <a:noAutofit/>
+          </a:bodyPr>
+          <a:lstStyle/>
+          <a:p>
+            <a:pPr algn="ctr"/>
+            <a:r>
+              <a:rPr lang="en-US" b="1" i="1" dirty="0">
+                <a:solidFill>
+                  <a:schemeClr val="bg1"/>
+                </a:solidFill>
+                <a:latin typeface="Calibri"/>
+                <a:ea typeface="Calibri"/>
+                <a:cs typeface="Calibri"/>
+                <a:sym typeface="Calibri"/>
+              </a:rPr>
+              <a:t>US Core</a:t>
+            </a:r>
+            <a:r>
+              <a:rPr lang="en-US" b="1" i="1" u="none" strike="noStrike" cap="none" dirty="0">
+                <a:solidFill>
+                  <a:schemeClr val="bg1"/>
+                </a:solidFill>
+                <a:latin typeface="Calibri"/>
+                <a:ea typeface="Calibri"/>
+                <a:cs typeface="Calibri"/>
+                <a:sym typeface="Calibri"/>
+              </a:rPr>
+              <a:t> Condition Problem and Health Concerns Profile </a:t>
+            </a:r>
+            <a:r>
+              <a:rPr lang="en-US" b="1" u="none" strike="noStrike" cap="none" dirty="0">
+                <a:solidFill>
+                  <a:schemeClr val="bg1"/>
+                </a:solidFill>
+                <a:latin typeface="Calibri"/>
+                <a:ea typeface="Calibri"/>
+                <a:cs typeface="Calibri"/>
+                <a:sym typeface="Calibri"/>
+              </a:rPr>
+              <a:t>Condition Codes:</a:t>
+            </a:r>
+            <a:endParaRPr lang="en-US" dirty="0">
+              <a:solidFill>
+                <a:schemeClr val="bg1"/>
+              </a:solidFill>
+              <a:latin typeface="Courier" pitchFamily="2" charset="0"/>
+            </a:endParaRPr>
+          </a:p>
+          <a:p>
+            <a:pPr marL="0" marR="0" lvl="0" indent="0" algn="ctr" rtl="0">
+              <a:spcBef>
+                <a:spcPts val="0"/>
+              </a:spcBef>
+              <a:spcAft>
+                <a:spcPts val="0"/>
+              </a:spcAft>
+              <a:buNone/>
+            </a:pPr>
+            <a:r>
+              <a:rPr lang="en" b="1" i="0" u="none" strike="noStrike" cap="none" dirty="0">
+                <a:solidFill>
+                  <a:schemeClr val="lt1"/>
+                </a:solidFill>
+                <a:latin typeface="Calibri"/>
+                <a:ea typeface="Calibri"/>
+                <a:cs typeface="Calibri"/>
+                <a:sym typeface="Calibri"/>
+              </a:rPr>
+              <a:t>ICD10, ICD9, SNOMED CT</a:t>
+            </a:r>
+            <a:endParaRPr b="1" dirty="0"/>
+          </a:p>
+        </p:txBody>
+      </p:sp>
+      <p:sp>
+        <p:nvSpPr>
+          <p:cNvPr id="10" name="Right Arrow 9">
+            <a:extLst>
+              <a:ext uri="{FF2B5EF4-FFF2-40B4-BE49-F238E27FC236}">
+                <a16:creationId xmlns:a16="http://schemas.microsoft.com/office/drawing/2014/main" id="{23069A2E-F071-409D-34F8-8333EC6FDEC5}"/>
+              </a:ext>
+            </a:extLst>
+          </p:cNvPr>
+          <p:cNvSpPr/>
+          <p:nvPr/>
+        </p:nvSpPr>
+        <p:spPr>
+          <a:xfrm>
+            <a:off x="5430517" y="2549710"/>
+            <a:ext cx="547007" cy="354962"/>
+          </a:xfrm>
+          <a:prstGeom prst="rightArrow">
+            <a:avLst/>
+          </a:prstGeom>
+        </p:spPr>
+        <p:style>
+          <a:lnRef idx="2">
+            <a:schemeClr val="accent1">
+              <a:shade val="50000"/>
+            </a:schemeClr>
+          </a:lnRef>
+          <a:fillRef idx="1">
+            <a:schemeClr val="accent1"/>
+          </a:fillRef>
+          <a:effectRef idx="0">
+            <a:schemeClr val="accent1"/>
+          </a:effectRef>
+          <a:fontRef idx="minor">
+            <a:schemeClr val="lt1"/>
+          </a:fontRef>
+        </p:style>
+        <p:txBody>
+          <a:bodyPr rtlCol="0" anchor="ctr"/>
+          <a:lstStyle/>
+          <a:p>
+            <a:pPr algn="ctr"/>
+            <a:endParaRPr lang="en-US"/>
+          </a:p>
+        </p:txBody>
+      </p:sp>
     </p:spTree>
   </p:cSld>
   <p:clrMapOvr>

</xml_diff>